<commit_message>
Atualizados slides da aula 4
</commit_message>
<xml_diff>
--- a/2023.02.01 Aula 00 - Ajuste do Plano de Aula v1.pptx
+++ b/2023.02.01 Aula 00 - Ajuste do Plano de Aula v1.pptx
@@ -213,7 +213,7 @@
             <a:fld id="{4EA5E1ED-E65E-440E-8A4B-5F5DC973F797}" type="datetimeFigureOut">
               <a:rPr lang="pt-BR" smtClean="0"/>
               <a:pPr/>
-              <a:t>22/02/2023</a:t>
+              <a:t>02/03/2023</a:t>
             </a:fld>
             <a:endParaRPr lang="pt-BR"/>
           </a:p>
@@ -630,7 +630,7 @@
           <a:p>
             <a:fld id="{1787AD07-0C2A-424C-83EF-FCCF4A0D3BA0}" type="datetime1">
               <a:rPr lang="pt-BR" smtClean="0"/>
-              <a:t>22/02/2023</a:t>
+              <a:t>02/03/2023</a:t>
             </a:fld>
             <a:endParaRPr lang="pt-BR"/>
           </a:p>
@@ -799,7 +799,7 @@
           <a:p>
             <a:fld id="{2F92FB66-59C8-46A5-AD82-5DAAFD2DC390}" type="datetime1">
               <a:rPr lang="pt-BR" smtClean="0"/>
-              <a:t>22/02/2023</a:t>
+              <a:t>02/03/2023</a:t>
             </a:fld>
             <a:endParaRPr lang="pt-BR"/>
           </a:p>
@@ -978,7 +978,7 @@
           <a:p>
             <a:fld id="{3D5CC8D2-C61E-4471-AD68-1C0D45A8EAFC}" type="datetime1">
               <a:rPr lang="pt-BR" smtClean="0"/>
-              <a:t>22/02/2023</a:t>
+              <a:t>02/03/2023</a:t>
             </a:fld>
             <a:endParaRPr lang="pt-BR"/>
           </a:p>
@@ -1121,7 +1121,7 @@
           <a:p>
             <a:fld id="{C3E38981-C08A-4A29-B885-392FB4EE0709}" type="datetime1">
               <a:rPr lang="pt-BR" smtClean="0"/>
-              <a:t>22/02/2023</a:t>
+              <a:t>02/03/2023</a:t>
             </a:fld>
             <a:endParaRPr lang="en-US" dirty="0"/>
           </a:p>
@@ -1506,7 +1506,7 @@
           <a:p>
             <a:fld id="{2CFE63D7-5B4A-40A4-8FD4-EA63D1010EB7}" type="datetime1">
               <a:rPr lang="pt-BR" smtClean="0"/>
-              <a:t>22/02/2023</a:t>
+              <a:t>02/03/2023</a:t>
             </a:fld>
             <a:endParaRPr lang="en-US" dirty="0"/>
           </a:p>
@@ -1728,7 +1728,7 @@
           <a:p>
             <a:fld id="{A9719147-5557-4D76-A2C3-BF25882771D2}" type="datetime1">
               <a:rPr lang="pt-BR" smtClean="0"/>
-              <a:t>22/02/2023</a:t>
+              <a:t>02/03/2023</a:t>
             </a:fld>
             <a:endParaRPr lang="en-US" dirty="0"/>
           </a:p>
@@ -2041,7 +2041,7 @@
           <a:p>
             <a:fld id="{66250340-7104-44A8-88A9-88532CCE9C1C}" type="datetime1">
               <a:rPr lang="pt-BR" smtClean="0"/>
-              <a:t>22/02/2023</a:t>
+              <a:t>02/03/2023</a:t>
             </a:fld>
             <a:endParaRPr lang="en-US" dirty="0"/>
           </a:p>
@@ -2226,7 +2226,7 @@
           <a:p>
             <a:fld id="{D047EA32-7810-48BE-A9BB-EA3D8AA5AD34}" type="datetime1">
               <a:rPr lang="pt-BR" smtClean="0"/>
-              <a:t>22/02/2023</a:t>
+              <a:t>02/03/2023</a:t>
             </a:fld>
             <a:endParaRPr lang="en-US" dirty="0"/>
           </a:p>
@@ -2374,7 +2374,7 @@
           <a:p>
             <a:fld id="{7C28E9E9-B91F-400E-BE43-87BB4B5C6F4E}" type="datetime1">
               <a:rPr lang="pt-BR" smtClean="0"/>
-              <a:t>22/02/2023</a:t>
+              <a:t>02/03/2023</a:t>
             </a:fld>
             <a:endParaRPr lang="en-US" dirty="0"/>
           </a:p>
@@ -2626,7 +2626,7 @@
           <a:p>
             <a:fld id="{A9E773EA-BFD5-41D4-8CCD-2C9F67DAB481}" type="datetime1">
               <a:rPr lang="pt-BR" smtClean="0"/>
-              <a:t>22/02/2023</a:t>
+              <a:t>02/03/2023</a:t>
             </a:fld>
             <a:endParaRPr lang="pt-BR" dirty="0"/>
           </a:p>
@@ -2828,7 +2828,7 @@
           <a:p>
             <a:fld id="{DAA7C8B6-CF57-4A95-AF6C-A77E6C230ED3}" type="datetime1">
               <a:rPr lang="pt-BR" smtClean="0"/>
-              <a:t>22/02/2023</a:t>
+              <a:t>02/03/2023</a:t>
             </a:fld>
             <a:endParaRPr lang="pt-BR"/>
           </a:p>
@@ -3112,7 +3112,7 @@
           <a:p>
             <a:fld id="{34D50989-24C8-4023-9B0D-A6D249548FD9}" type="datetime1">
               <a:rPr lang="pt-BR" smtClean="0"/>
-              <a:t>22/02/2023</a:t>
+              <a:t>02/03/2023</a:t>
             </a:fld>
             <a:endParaRPr lang="pt-BR"/>
           </a:p>
@@ -3348,7 +3348,7 @@
           <a:p>
             <a:fld id="{8D9BC96A-9776-4585-A439-BC9E2DA226C1}" type="datetime1">
               <a:rPr lang="pt-BR" smtClean="0"/>
-              <a:t>22/02/2023</a:t>
+              <a:t>02/03/2023</a:t>
             </a:fld>
             <a:endParaRPr lang="pt-BR"/>
           </a:p>
@@ -3731,7 +3731,7 @@
           <a:p>
             <a:fld id="{7D12BE36-2922-4567-BD67-201EFA21BF6D}" type="datetime1">
               <a:rPr lang="pt-BR" smtClean="0"/>
-              <a:t>22/02/2023</a:t>
+              <a:t>02/03/2023</a:t>
             </a:fld>
             <a:endParaRPr lang="pt-BR"/>
           </a:p>
@@ -3843,7 +3843,7 @@
           <a:p>
             <a:fld id="{E5B462A9-4B1E-4013-BFB1-FC92225AC2F2}" type="datetime1">
               <a:rPr lang="pt-BR" smtClean="0"/>
-              <a:t>22/02/2023</a:t>
+              <a:t>02/03/2023</a:t>
             </a:fld>
             <a:endParaRPr lang="pt-BR"/>
           </a:p>
@@ -3927,7 +3927,7 @@
           <a:p>
             <a:fld id="{D0E6EC7A-67E7-4978-9BAE-C8F82A40B13B}" type="datetime1">
               <a:rPr lang="pt-BR" smtClean="0"/>
-              <a:t>22/02/2023</a:t>
+              <a:t>02/03/2023</a:t>
             </a:fld>
             <a:endParaRPr lang="pt-BR"/>
           </a:p>
@@ -4209,7 +4209,7 @@
           <a:p>
             <a:fld id="{6E085A4E-80B8-47DD-9D9B-8E1B205CBB30}" type="datetime1">
               <a:rPr lang="pt-BR" smtClean="0"/>
-              <a:t>22/02/2023</a:t>
+              <a:t>02/03/2023</a:t>
             </a:fld>
             <a:endParaRPr lang="pt-BR"/>
           </a:p>
@@ -4468,7 +4468,7 @@
           <a:p>
             <a:fld id="{F4E9A02C-D9AD-4B8C-9B93-B0980E8E86EB}" type="datetime1">
               <a:rPr lang="pt-BR" smtClean="0"/>
-              <a:t>22/02/2023</a:t>
+              <a:t>02/03/2023</a:t>
             </a:fld>
             <a:endParaRPr lang="pt-BR"/>
           </a:p>
@@ -4680,7 +4680,7 @@
           <a:p>
             <a:fld id="{202762D0-3A59-4B14-83BA-8E0FC8A60AB1}" type="datetime1">
               <a:rPr lang="pt-BR" smtClean="0"/>
-              <a:t>22/02/2023</a:t>
+              <a:t>02/03/2023</a:t>
             </a:fld>
             <a:endParaRPr lang="pt-BR"/>
           </a:p>
@@ -6858,7 +6858,7 @@
           <p:nvPr>
             <p:extLst>
               <p:ext uri="{D42A27DB-BD31-4B8C-83A1-F6EECF244321}">
-                <p14:modId xmlns:p14="http://schemas.microsoft.com/office/powerpoint/2010/main" val="3252224469"/>
+                <p14:modId xmlns:p14="http://schemas.microsoft.com/office/powerpoint/2010/main" val="1016197513"/>
               </p:ext>
             </p:extLst>
           </p:nvPr>
@@ -8058,9 +8058,10 @@
                     <a:lstStyle/>
                     <a:p>
                       <a:r>
-                        <a:rPr lang="pt-BR" sz="800" dirty="0"/>
-                        <a:t>02/05</a:t>
+                        <a:rPr lang="pt-BR" sz="800"/>
+                        <a:t>02/06</a:t>
                       </a:r>
+                      <a:endParaRPr lang="pt-BR" sz="800" dirty="0"/>
                     </a:p>
                   </a:txBody>
                   <a:tcPr/>

</xml_diff>